<commit_message>
finaly touches to assignment.
</commit_message>
<xml_diff>
--- a/Depression and Poverty.pptx
+++ b/Depression and Poverty.pptx
@@ -5,7 +5,7 @@
     <p:sldMasterId id="2147483648" r:id="rId4"/>
   </p:sldMasterIdLst>
   <p:notesMasterIdLst>
-    <p:notesMasterId r:id="rId25"/>
+    <p:notesMasterId r:id="rId30"/>
   </p:notesMasterIdLst>
   <p:sldIdLst>
     <p:sldId id="277" r:id="rId5"/>
@@ -25,9 +25,14 @@
     <p:sldId id="292" r:id="rId19"/>
     <p:sldId id="293" r:id="rId20"/>
     <p:sldId id="298" r:id="rId21"/>
-    <p:sldId id="297" r:id="rId22"/>
-    <p:sldId id="295" r:id="rId23"/>
-    <p:sldId id="296" r:id="rId24"/>
+    <p:sldId id="299" r:id="rId22"/>
+    <p:sldId id="297" r:id="rId23"/>
+    <p:sldId id="300" r:id="rId24"/>
+    <p:sldId id="295" r:id="rId25"/>
+    <p:sldId id="301" r:id="rId26"/>
+    <p:sldId id="296" r:id="rId27"/>
+    <p:sldId id="302" r:id="rId28"/>
+    <p:sldId id="303" r:id="rId29"/>
   </p:sldIdLst>
   <p:sldSz cx="12192000" cy="6858000"/>
   <p:notesSz cx="6858000" cy="9144000"/>
@@ -216,7 +221,7 @@
           <a:p>
             <a:fld id="{181EC09C-9CDC-48F0-BB82-ED223F986966}" type="datetimeFigureOut">
               <a:rPr lang="en-US" smtClean="0"/>
-              <a:t>10/7/2022</a:t>
+              <a:t>10/9/2022</a:t>
             </a:fld>
             <a:endParaRPr lang="en-US" dirty="0"/>
           </a:p>
@@ -710,7 +715,7 @@
           <a:p>
             <a:fld id="{9D874152-028B-486A-9CCC-467A5536A7DC}" type="datetime1">
               <a:rPr lang="en-US" smtClean="0"/>
-              <a:t>10/7/2022</a:t>
+              <a:t>10/9/2022</a:t>
             </a:fld>
             <a:endParaRPr lang="en-US" dirty="0"/>
           </a:p>
@@ -1038,7 +1043,7 @@
           <a:p>
             <a:fld id="{8A1558FF-9F53-4DAD-84A1-1EEE4F190FF1}" type="datetime1">
               <a:rPr lang="en-US" smtClean="0"/>
-              <a:t>10/7/2022</a:t>
+              <a:t>10/9/2022</a:t>
             </a:fld>
             <a:endParaRPr lang="en-US" dirty="0"/>
           </a:p>
@@ -1311,7 +1316,7 @@
           <a:p>
             <a:fld id="{A78FA1A6-D89D-4E0B-ACDC-F92429034F56}" type="datetime1">
               <a:rPr lang="en-US" smtClean="0"/>
-              <a:t>10/7/2022</a:t>
+              <a:t>10/9/2022</a:t>
             </a:fld>
             <a:endParaRPr lang="en-US" dirty="0"/>
           </a:p>
@@ -1874,7 +1879,7 @@
           <a:p>
             <a:fld id="{8BA382F0-6EA8-4D82-951F-1579D6A93CC4}" type="datetime1">
               <a:rPr lang="en-US" smtClean="0"/>
-              <a:t>10/7/2022</a:t>
+              <a:t>10/9/2022</a:t>
             </a:fld>
             <a:endParaRPr lang="en-US" dirty="0"/>
           </a:p>
@@ -2147,7 +2152,7 @@
           <a:p>
             <a:fld id="{CDBE913C-F349-4CE3-A910-0EA13427FE0D}" type="datetime1">
               <a:rPr lang="en-US" smtClean="0"/>
-              <a:t>10/7/2022</a:t>
+              <a:t>10/9/2022</a:t>
             </a:fld>
             <a:endParaRPr lang="en-US" dirty="0"/>
           </a:p>
@@ -2704,7 +2709,7 @@
           <a:p>
             <a:fld id="{70D4C5C7-4D27-4EBE-9DB8-92F5F0F40B34}" type="datetime1">
               <a:rPr lang="en-US" smtClean="0"/>
-              <a:t>10/7/2022</a:t>
+              <a:t>10/9/2022</a:t>
             </a:fld>
             <a:endParaRPr lang="en-US" dirty="0"/>
           </a:p>
@@ -3026,7 +3031,7 @@
           <a:p>
             <a:fld id="{B6CDAF82-EDB2-4FBF-83F4-247A1B3455CB}" type="datetime1">
               <a:rPr lang="en-US" smtClean="0"/>
-              <a:t>10/7/2022</a:t>
+              <a:t>10/9/2022</a:t>
             </a:fld>
             <a:endParaRPr lang="en-US" dirty="0"/>
           </a:p>
@@ -3198,7 +3203,7 @@
           <a:p>
             <a:fld id="{2D5E59DB-4C5A-44A3-897C-FF6803F94296}" type="datetime1">
               <a:rPr lang="en-US" smtClean="0"/>
-              <a:t>10/7/2022</a:t>
+              <a:t>10/9/2022</a:t>
             </a:fld>
             <a:endParaRPr lang="en-US" dirty="0"/>
           </a:p>
@@ -3429,7 +3434,7 @@
           <a:p>
             <a:fld id="{E9F6B6E0-E0F8-4800-BD74-7D33DFE5ED7E}" type="datetime1">
               <a:rPr lang="en-US" smtClean="0"/>
-              <a:t>10/7/2022</a:t>
+              <a:t>10/9/2022</a:t>
             </a:fld>
             <a:endParaRPr lang="en-US" dirty="0"/>
           </a:p>
@@ -3623,7 +3628,7 @@
           <a:p>
             <a:fld id="{6E6DC824-D0E7-4046-8B44-4AAD1C4DE2CF}" type="datetime1">
               <a:rPr lang="en-US" smtClean="0"/>
-              <a:t>10/7/2022</a:t>
+              <a:t>10/9/2022</a:t>
             </a:fld>
             <a:endParaRPr lang="en-US" dirty="0"/>
           </a:p>
@@ -3894,7 +3899,7 @@
           <a:p>
             <a:fld id="{FEFC221C-17A4-4F42-9F54-9F7E03AA1BBB}" type="datetime1">
               <a:rPr lang="en-US" smtClean="0"/>
-              <a:t>10/7/2022</a:t>
+              <a:t>10/9/2022</a:t>
             </a:fld>
             <a:endParaRPr lang="en-US" dirty="0"/>
           </a:p>
@@ -4153,7 +4158,7 @@
           <a:p>
             <a:fld id="{38CD7CBA-5256-42F3-BAB5-33F095514AE3}" type="datetime1">
               <a:rPr lang="en-US" smtClean="0"/>
-              <a:t>10/7/2022</a:t>
+              <a:t>10/9/2022</a:t>
             </a:fld>
             <a:endParaRPr lang="en-US" dirty="0"/>
           </a:p>
@@ -4520,7 +4525,7 @@
           <a:p>
             <a:fld id="{8EB80C04-2E33-403B-B014-7E203A57326C}" type="datetime1">
               <a:rPr lang="en-US" smtClean="0"/>
-              <a:t>10/7/2022</a:t>
+              <a:t>10/9/2022</a:t>
             </a:fld>
             <a:endParaRPr lang="en-US" dirty="0"/>
           </a:p>
@@ -4663,7 +4668,7 @@
           <a:p>
             <a:fld id="{8C92A49D-7D7F-4D69-A8AA-65D6B58C15F2}" type="datetime1">
               <a:rPr lang="en-US" smtClean="0"/>
-              <a:t>10/7/2022</a:t>
+              <a:t>10/9/2022</a:t>
             </a:fld>
             <a:endParaRPr lang="en-US" dirty="0"/>
           </a:p>
@@ -4784,7 +4789,7 @@
           <a:p>
             <a:fld id="{09E02903-36C1-4F6B-9F27-EA2305255204}" type="datetime1">
               <a:rPr lang="en-US" smtClean="0"/>
-              <a:t>10/7/2022</a:t>
+              <a:t>10/9/2022</a:t>
             </a:fld>
             <a:endParaRPr lang="en-US" dirty="0"/>
           </a:p>
@@ -5063,7 +5068,7 @@
           <a:p>
             <a:fld id="{2E8BBFA8-C775-4121-A7F6-6851C8035873}" type="datetime1">
               <a:rPr lang="en-US" smtClean="0"/>
-              <a:t>10/7/2022</a:t>
+              <a:t>10/9/2022</a:t>
             </a:fld>
             <a:endParaRPr lang="en-US" dirty="0"/>
           </a:p>
@@ -5381,7 +5386,7 @@
           <a:p>
             <a:fld id="{6EC01760-8EEC-4A4C-BD0D-3CDAAA80A266}" type="datetime1">
               <a:rPr lang="en-US" smtClean="0"/>
-              <a:t>10/7/2022</a:t>
+              <a:t>10/9/2022</a:t>
             </a:fld>
             <a:endParaRPr lang="en-US" dirty="0"/>
           </a:p>
@@ -5589,7 +5594,7 @@
           <a:p>
             <a:fld id="{B183DE74-4CAD-4852-95E7-A055FD779420}" type="datetime1">
               <a:rPr lang="en-US" smtClean="0"/>
-              <a:t>10/7/2022</a:t>
+              <a:t>10/9/2022</a:t>
             </a:fld>
             <a:endParaRPr lang="en-US" dirty="0"/>
           </a:p>
@@ -7221,220 +7226,6 @@
         </p:nvSpPr>
         <p:spPr>
           <a:xfrm>
-            <a:off x="825909" y="808055"/>
-            <a:ext cx="3979205" cy="1453363"/>
-          </a:xfrm>
-        </p:spPr>
-        <p:txBody>
-          <a:bodyPr>
-            <a:normAutofit/>
-          </a:bodyPr>
-          <a:lstStyle/>
-          <a:p>
-            <a:r>
-              <a:rPr lang="en-US" dirty="0"/>
-              <a:t>Prepare - visualization</a:t>
-            </a:r>
-          </a:p>
-        </p:txBody>
-      </p:sp>
-      <p:sp>
-        <p:nvSpPr>
-          <p:cNvPr id="3" name="Content Placeholder 2">
-            <a:extLst>
-              <a:ext uri="{FF2B5EF4-FFF2-40B4-BE49-F238E27FC236}">
-                <a16:creationId xmlns:a16="http://schemas.microsoft.com/office/drawing/2014/main" id="{DC85A989-5402-BC96-C2B7-D8D33791FA38}"/>
-              </a:ext>
-            </a:extLst>
-          </p:cNvPr>
-          <p:cNvSpPr>
-            <a:spLocks noGrp="1"/>
-          </p:cNvSpPr>
-          <p:nvPr>
-            <p:ph idx="1"/>
-          </p:nvPr>
-        </p:nvSpPr>
-        <p:spPr>
-          <a:xfrm>
-            <a:off x="802178" y="2261420"/>
-            <a:ext cx="4002936" cy="3637935"/>
-          </a:xfrm>
-        </p:spPr>
-        <p:txBody>
-          <a:bodyPr>
-            <a:normAutofit/>
-          </a:bodyPr>
-          <a:lstStyle/>
-          <a:p>
-            <a:r>
-              <a:rPr lang="en-US" dirty="0"/>
-              <a:t>Histogram of dependent variable DEPRESSION.  Left Skew.</a:t>
-            </a:r>
-          </a:p>
-          <a:p>
-            <a:r>
-              <a:rPr lang="en-US" dirty="0"/>
-              <a:t>AJ32:  Feeling depressed in the past 30 days?</a:t>
-            </a:r>
-          </a:p>
-          <a:p>
-            <a:r>
-              <a:rPr lang="en-US" dirty="0"/>
-              <a:t>Coding:</a:t>
-            </a:r>
-          </a:p>
-          <a:p>
-            <a:pPr lvl="1"/>
-            <a:r>
-              <a:rPr lang="en-US" dirty="0"/>
-              <a:t>1 = all the time</a:t>
-            </a:r>
-          </a:p>
-          <a:p>
-            <a:pPr lvl="1"/>
-            <a:r>
-              <a:rPr lang="en-US" dirty="0"/>
-              <a:t>2 = most of the time</a:t>
-            </a:r>
-          </a:p>
-          <a:p>
-            <a:pPr lvl="1"/>
-            <a:r>
-              <a:rPr lang="en-US" dirty="0"/>
-              <a:t>3 = some of the time</a:t>
-            </a:r>
-          </a:p>
-          <a:p>
-            <a:pPr lvl="1"/>
-            <a:r>
-              <a:rPr lang="en-US" dirty="0"/>
-              <a:t>4 = a little of the time</a:t>
-            </a:r>
-          </a:p>
-          <a:p>
-            <a:pPr lvl="1"/>
-            <a:r>
-              <a:rPr lang="en-US" dirty="0"/>
-              <a:t>5 = not at all</a:t>
-            </a:r>
-          </a:p>
-        </p:txBody>
-      </p:sp>
-      <p:pic>
-        <p:nvPicPr>
-          <p:cNvPr id="5" name="Picture 4">
-            <a:extLst>
-              <a:ext uri="{FF2B5EF4-FFF2-40B4-BE49-F238E27FC236}">
-                <a16:creationId xmlns:a16="http://schemas.microsoft.com/office/drawing/2014/main" id="{10741974-C187-D111-F471-CA2406DAAA19}"/>
-              </a:ext>
-            </a:extLst>
-          </p:cNvPr>
-          <p:cNvPicPr>
-            <a:picLocks noChangeAspect="1"/>
-          </p:cNvPicPr>
-          <p:nvPr/>
-        </p:nvPicPr>
-        <p:blipFill>
-          <a:blip r:embed="rId3"/>
-          <a:stretch>
-            <a:fillRect/>
-          </a:stretch>
-        </p:blipFill>
-        <p:spPr>
-          <a:xfrm>
-            <a:off x="5289752" y="1321100"/>
-            <a:ext cx="6095593" cy="4053569"/>
-          </a:xfrm>
-          <a:prstGeom prst="roundRect">
-            <a:avLst>
-              <a:gd name="adj" fmla="val 4380"/>
-            </a:avLst>
-          </a:prstGeom>
-          <a:ln w="50800" cap="sq" cmpd="dbl">
-            <a:gradFill flip="none" rotWithShape="1">
-              <a:gsLst>
-                <a:gs pos="0">
-                  <a:srgbClr val="FFFFFF"/>
-                </a:gs>
-                <a:gs pos="100000">
-                  <a:schemeClr val="tx1">
-                    <a:alpha val="0"/>
-                  </a:schemeClr>
-                </a:gs>
-              </a:gsLst>
-              <a:path path="circle">
-                <a:fillToRect l="50000" t="50000" r="50000" b="50000"/>
-              </a:path>
-              <a:tileRect/>
-            </a:gradFill>
-            <a:miter lim="800000"/>
-          </a:ln>
-          <a:effectLst>
-            <a:outerShdw blurRad="254000" algn="tl" rotWithShape="0">
-              <a:srgbClr val="000000">
-                <a:alpha val="43000"/>
-              </a:srgbClr>
-            </a:outerShdw>
-          </a:effectLst>
-        </p:spPr>
-      </p:pic>
-    </p:spTree>
-    <p:extLst>
-      <p:ext uri="{BB962C8B-B14F-4D97-AF65-F5344CB8AC3E}">
-        <p14:creationId xmlns:p14="http://schemas.microsoft.com/office/powerpoint/2010/main" val="2666384942"/>
-      </p:ext>
-    </p:extLst>
-  </p:cSld>
-  <p:clrMapOvr>
-    <a:masterClrMapping/>
-  </p:clrMapOvr>
-</p:sld>
-</file>
-
-<file path=ppt/slides/slide18.xml><?xml version="1.0" encoding="utf-8"?>
-<p:sld xmlns:a="http://schemas.openxmlformats.org/drawingml/2006/main" xmlns:r="http://schemas.openxmlformats.org/officeDocument/2006/relationships" xmlns:p="http://schemas.openxmlformats.org/presentationml/2006/main">
-  <p:cSld>
-    <p:bg>
-      <p:bgPr>
-        <a:blipFill>
-          <a:blip r:embed="rId2"/>
-          <a:stretch/>
-        </a:blipFill>
-        <a:effectLst/>
-      </p:bgPr>
-    </p:bg>
-    <p:spTree>
-      <p:nvGrpSpPr>
-        <p:cNvPr id="1" name=""/>
-        <p:cNvGrpSpPr/>
-        <p:nvPr/>
-      </p:nvGrpSpPr>
-      <p:grpSpPr>
-        <a:xfrm>
-          <a:off x="0" y="0"/>
-          <a:ext cx="0" cy="0"/>
-          <a:chOff x="0" y="0"/>
-          <a:chExt cx="0" cy="0"/>
-        </a:xfrm>
-      </p:grpSpPr>
-      <p:sp>
-        <p:nvSpPr>
-          <p:cNvPr id="2" name="Title 1">
-            <a:extLst>
-              <a:ext uri="{FF2B5EF4-FFF2-40B4-BE49-F238E27FC236}">
-                <a16:creationId xmlns:a16="http://schemas.microsoft.com/office/drawing/2014/main" id="{5CCEBF4E-E8B1-9096-8674-FD4FE0A9A5C9}"/>
-              </a:ext>
-            </a:extLst>
-          </p:cNvPr>
-          <p:cNvSpPr>
-            <a:spLocks noGrp="1"/>
-          </p:cNvSpPr>
-          <p:nvPr>
-            <p:ph type="title"/>
-          </p:nvPr>
-        </p:nvSpPr>
-        <p:spPr>
-          <a:xfrm>
             <a:off x="1361187" y="1030288"/>
             <a:ext cx="4099947" cy="1035579"/>
           </a:xfrm>
@@ -7451,7 +7242,7 @@
               </a:lnSpc>
             </a:pPr>
             <a:r>
-              <a:rPr lang="en-US" sz="3300" dirty="0"/>
+              <a:rPr lang="en-US" sz="3300"/>
               <a:t>Prepare - visualization</a:t>
             </a:r>
           </a:p>
@@ -7459,7 +7250,7 @@
       </p:sp>
       <p:sp>
         <p:nvSpPr>
-          <p:cNvPr id="12" name="Rectangle 11">
+          <p:cNvPr id="21" name="Rectangle 14">
             <a:extLst>
               <a:ext uri="{FF2B5EF4-FFF2-40B4-BE49-F238E27FC236}">
                 <a16:creationId xmlns:a16="http://schemas.microsoft.com/office/drawing/2014/main" id="{1C04857D-B1C1-41ED-B1B4-E3D6E3C7C4E6}"/>
@@ -7519,7 +7310,7 @@
           <a:lstStyle/>
           <a:p>
             <a:pPr algn="ctr"/>
-            <a:endParaRPr lang="en-US" dirty="0"/>
+            <a:endParaRPr lang="en-US"/>
           </a:p>
         </p:txBody>
       </p:sp>
@@ -7528,7 +7319,7 @@
           <p:cNvPr id="3" name="Content Placeholder 2">
             <a:extLst>
               <a:ext uri="{FF2B5EF4-FFF2-40B4-BE49-F238E27FC236}">
-                <a16:creationId xmlns:a16="http://schemas.microsoft.com/office/drawing/2014/main" id="{BF7B5371-0AD5-B9BB-511A-48DDF3A6A25C}"/>
+                <a16:creationId xmlns:a16="http://schemas.microsoft.com/office/drawing/2014/main" id="{DC85A989-5402-BC96-C2B7-D8D33791FA38}"/>
               </a:ext>
             </a:extLst>
           </p:cNvPr>
@@ -7553,57 +7344,61 @@
           <a:p>
             <a:r>
               <a:rPr lang="en-US" dirty="0"/>
-              <a:t>Histogram of POVERTY and box plot of DEPRESSION vs POVERTY.  Left Skew.</a:t>
-            </a:r>
-          </a:p>
-          <a:p>
-            <a:r>
-              <a:rPr lang="en-US" dirty="0"/>
-              <a:t>Federal Poverty level (FPL)</a:t>
-            </a:r>
-          </a:p>
-          <a:p>
-            <a:r>
-              <a:rPr lang="en-US" dirty="0"/>
-              <a:t>Coding</a:t>
+              <a:t>Histogram of dependent variable DEPRESSION.  Left Skew.</a:t>
+            </a:r>
+          </a:p>
+          <a:p>
+            <a:r>
+              <a:rPr lang="en-US" dirty="0"/>
+              <a:t>AJ32:  Feeling depressed in the past 30 days?</a:t>
+            </a:r>
+          </a:p>
+          <a:p>
+            <a:r>
+              <a:rPr lang="en-US" dirty="0"/>
+              <a:t>Coding:</a:t>
             </a:r>
           </a:p>
           <a:p>
             <a:pPr lvl="1"/>
             <a:r>
               <a:rPr lang="en-US" dirty="0"/>
-              <a:t>1 = 0-99% FPL</a:t>
+              <a:t>1 = all the time</a:t>
             </a:r>
           </a:p>
           <a:p>
             <a:pPr lvl="1"/>
             <a:r>
               <a:rPr lang="en-US" dirty="0"/>
-              <a:t>2 = 100 to 199% FPL</a:t>
+              <a:t>2 = most of the time</a:t>
             </a:r>
           </a:p>
           <a:p>
             <a:pPr lvl="1"/>
             <a:r>
               <a:rPr lang="en-US" dirty="0"/>
-              <a:t>3 = 200 to 299% FPL</a:t>
+              <a:t>3 = some of the time</a:t>
             </a:r>
           </a:p>
           <a:p>
             <a:pPr lvl="1"/>
             <a:r>
               <a:rPr lang="en-US" dirty="0"/>
-              <a:t>4 = 300% FPL and above</a:t>
-            </a:r>
-          </a:p>
-          <a:p>
-            <a:endParaRPr lang="en-US" dirty="0"/>
-          </a:p>
-        </p:txBody>
-      </p:sp>
-      <p:sp>
-        <p:nvSpPr>
-          <p:cNvPr id="14" name="Rounded Rectangle 32">
+              <a:t>4 = a little of the time</a:t>
+            </a:r>
+          </a:p>
+          <a:p>
+            <a:pPr lvl="1"/>
+            <a:r>
+              <a:rPr lang="en-US" dirty="0"/>
+              <a:t>5 = not at all</a:t>
+            </a:r>
+          </a:p>
+        </p:txBody>
+      </p:sp>
+      <p:sp>
+        <p:nvSpPr>
+          <p:cNvPr id="22" name="Rounded Rectangle 32">
             <a:extLst>
               <a:ext uri="{FF2B5EF4-FFF2-40B4-BE49-F238E27FC236}">
                 <a16:creationId xmlns:a16="http://schemas.microsoft.com/office/drawing/2014/main" id="{E5A9FA1E-7A9B-4CDA-91BB-87575F63E28F}"/>
@@ -7685,16 +7480,16 @@
           <a:lstStyle/>
           <a:p>
             <a:pPr algn="ctr"/>
-            <a:endParaRPr lang="en-US" dirty="0"/>
+            <a:endParaRPr lang="en-US"/>
           </a:p>
         </p:txBody>
       </p:sp>
       <p:pic>
         <p:nvPicPr>
-          <p:cNvPr id="7" name="Picture 6">
+          <p:cNvPr id="8" name="Picture 7">
             <a:extLst>
               <a:ext uri="{FF2B5EF4-FFF2-40B4-BE49-F238E27FC236}">
-                <a16:creationId xmlns:a16="http://schemas.microsoft.com/office/drawing/2014/main" id="{806D110C-242B-8C60-0D8F-CF1282F2633A}"/>
+                <a16:creationId xmlns:a16="http://schemas.microsoft.com/office/drawing/2014/main" id="{E9CE5829-30D5-A94B-71DD-F2E0F92A5C29}"/>
               </a:ext>
             </a:extLst>
           </p:cNvPr>
@@ -7711,8 +7506,8 @@
         </p:blipFill>
         <p:spPr>
           <a:xfrm>
-            <a:off x="6870642" y="733077"/>
-            <a:ext cx="3849037" cy="2636590"/>
+            <a:off x="6774785" y="733077"/>
+            <a:ext cx="4040751" cy="2636590"/>
           </a:xfrm>
           <a:prstGeom prst="roundRect">
             <a:avLst>
@@ -7728,10 +7523,10 @@
       </p:pic>
       <p:pic>
         <p:nvPicPr>
-          <p:cNvPr id="5" name="Picture 4">
+          <p:cNvPr id="10" name="Picture 9">
             <a:extLst>
               <a:ext uri="{FF2B5EF4-FFF2-40B4-BE49-F238E27FC236}">
-                <a16:creationId xmlns:a16="http://schemas.microsoft.com/office/drawing/2014/main" id="{9EF96106-AAF5-9CDE-3244-DD9EEFCDD7FD}"/>
+                <a16:creationId xmlns:a16="http://schemas.microsoft.com/office/drawing/2014/main" id="{6D87407C-7549-7608-29B3-30718BDFE9F8}"/>
               </a:ext>
             </a:extLst>
           </p:cNvPr>
@@ -7766,7 +7561,103 @@
     </p:spTree>
     <p:extLst>
       <p:ext uri="{BB962C8B-B14F-4D97-AF65-F5344CB8AC3E}">
-        <p14:creationId xmlns:p14="http://schemas.microsoft.com/office/powerpoint/2010/main" val="1693192200"/>
+        <p14:creationId xmlns:p14="http://schemas.microsoft.com/office/powerpoint/2010/main" val="2666384942"/>
+      </p:ext>
+    </p:extLst>
+  </p:cSld>
+  <p:clrMapOvr>
+    <a:masterClrMapping/>
+  </p:clrMapOvr>
+</p:sld>
+</file>
+
+<file path=ppt/slides/slide18.xml><?xml version="1.0" encoding="utf-8"?>
+<p:sld xmlns:a="http://schemas.openxmlformats.org/drawingml/2006/main" xmlns:r="http://schemas.openxmlformats.org/officeDocument/2006/relationships" xmlns:p="http://schemas.openxmlformats.org/presentationml/2006/main">
+  <p:cSld>
+    <p:spTree>
+      <p:nvGrpSpPr>
+        <p:cNvPr id="1" name=""/>
+        <p:cNvGrpSpPr/>
+        <p:nvPr/>
+      </p:nvGrpSpPr>
+      <p:grpSpPr>
+        <a:xfrm>
+          <a:off x="0" y="0"/>
+          <a:ext cx="0" cy="0"/>
+          <a:chOff x="0" y="0"/>
+          <a:chExt cx="0" cy="0"/>
+        </a:xfrm>
+      </p:grpSpPr>
+      <p:sp>
+        <p:nvSpPr>
+          <p:cNvPr id="2" name="Title 1">
+            <a:extLst>
+              <a:ext uri="{FF2B5EF4-FFF2-40B4-BE49-F238E27FC236}">
+                <a16:creationId xmlns:a16="http://schemas.microsoft.com/office/drawing/2014/main" id="{93D0AD1F-5F76-6DD7-E777-C4C3B2E42C24}"/>
+              </a:ext>
+            </a:extLst>
+          </p:cNvPr>
+          <p:cNvSpPr>
+            <a:spLocks noGrp="1"/>
+          </p:cNvSpPr>
+          <p:nvPr>
+            <p:ph type="title"/>
+          </p:nvPr>
+        </p:nvSpPr>
+        <p:spPr/>
+        <p:txBody>
+          <a:bodyPr/>
+          <a:lstStyle/>
+          <a:p>
+            <a:r>
+              <a:rPr lang="en-US" dirty="0"/>
+              <a:t>Prepare - visualization</a:t>
+            </a:r>
+          </a:p>
+        </p:txBody>
+      </p:sp>
+      <p:sp>
+        <p:nvSpPr>
+          <p:cNvPr id="3" name="Content Placeholder 2">
+            <a:extLst>
+              <a:ext uri="{FF2B5EF4-FFF2-40B4-BE49-F238E27FC236}">
+                <a16:creationId xmlns:a16="http://schemas.microsoft.com/office/drawing/2014/main" id="{B17974D4-B364-9B6E-3118-0C3AEBE1DD7D}"/>
+              </a:ext>
+            </a:extLst>
+          </p:cNvPr>
+          <p:cNvSpPr>
+            <a:spLocks noGrp="1"/>
+          </p:cNvSpPr>
+          <p:nvPr>
+            <p:ph idx="1"/>
+          </p:nvPr>
+        </p:nvSpPr>
+        <p:spPr/>
+        <p:txBody>
+          <a:bodyPr/>
+          <a:lstStyle/>
+          <a:p>
+            <a:r>
+              <a:rPr lang="en-US" u="sng" dirty="0"/>
+              <a:t>Observations - DEPRESSION</a:t>
+            </a:r>
+            <a:r>
+              <a:rPr lang="en-US" dirty="0"/>
+              <a:t>:  Very difficult to determine much from the box plot.    This may be because in the histogram it appears as if there are relatively few people that are depressed compared to those that are not depressed.  </a:t>
+            </a:r>
+          </a:p>
+          <a:p>
+            <a:r>
+              <a:rPr lang="en-US" dirty="0"/>
+              <a:t>Histogram shows left skew, meaning the distribution is not normal.  Need to keep this in mind if using an algorithm that assumes normal data.</a:t>
+            </a:r>
+          </a:p>
+        </p:txBody>
+      </p:sp>
+    </p:spTree>
+    <p:extLst>
+      <p:ext uri="{BB962C8B-B14F-4D97-AF65-F5344CB8AC3E}">
+        <p14:creationId xmlns:p14="http://schemas.microsoft.com/office/powerpoint/2010/main" val="911170558"/>
       </p:ext>
     </p:extLst>
   </p:cSld>
@@ -7807,7 +7698,7 @@
           <p:cNvPr id="2" name="Title 1">
             <a:extLst>
               <a:ext uri="{FF2B5EF4-FFF2-40B4-BE49-F238E27FC236}">
-                <a16:creationId xmlns:a16="http://schemas.microsoft.com/office/drawing/2014/main" id="{83776FF5-8955-6F73-4193-6E1275F9A237}"/>
+                <a16:creationId xmlns:a16="http://schemas.microsoft.com/office/drawing/2014/main" id="{5CCEBF4E-E8B1-9096-8674-FD4FE0A9A5C9}"/>
               </a:ext>
             </a:extLst>
           </p:cNvPr>
@@ -7844,7 +7735,7 @@
       </p:sp>
       <p:sp>
         <p:nvSpPr>
-          <p:cNvPr id="25" name="Rectangle 18">
+          <p:cNvPr id="34" name="Rectangle 27">
             <a:extLst>
               <a:ext uri="{FF2B5EF4-FFF2-40B4-BE49-F238E27FC236}">
                 <a16:creationId xmlns:a16="http://schemas.microsoft.com/office/drawing/2014/main" id="{1C04857D-B1C1-41ED-B1B4-E3D6E3C7C4E6}"/>
@@ -7904,7 +7795,7 @@
           <a:lstStyle/>
           <a:p>
             <a:pPr algn="ctr"/>
-            <a:endParaRPr lang="en-US" dirty="0"/>
+            <a:endParaRPr lang="en-US"/>
           </a:p>
         </p:txBody>
       </p:sp>
@@ -7913,7 +7804,7 @@
           <p:cNvPr id="3" name="Content Placeholder 2">
             <a:extLst>
               <a:ext uri="{FF2B5EF4-FFF2-40B4-BE49-F238E27FC236}">
-                <a16:creationId xmlns:a16="http://schemas.microsoft.com/office/drawing/2014/main" id="{5D579FFF-C95B-B04E-ABF3-99801746C7B4}"/>
+                <a16:creationId xmlns:a16="http://schemas.microsoft.com/office/drawing/2014/main" id="{BF7B5371-0AD5-B9BB-511A-48DDF3A6A25C}"/>
               </a:ext>
             </a:extLst>
           </p:cNvPr>
@@ -7938,13 +7829,13 @@
           <a:p>
             <a:r>
               <a:rPr lang="en-US" dirty="0"/>
-              <a:t>Histogram of SMOKING and box plot of DEPRESSION vs SMOKING.  Left Skew.</a:t>
-            </a:r>
-          </a:p>
-          <a:p>
-            <a:r>
-              <a:rPr lang="en-US" dirty="0"/>
-              <a:t>Current smoking habits</a:t>
+              <a:t>Histogram &amp; Boxplot of POVERTY,.  Left Skew.</a:t>
+            </a:r>
+          </a:p>
+          <a:p>
+            <a:r>
+              <a:rPr lang="en-US" dirty="0"/>
+              <a:t>Federal Poverty level (FPL)</a:t>
             </a:r>
           </a:p>
           <a:p>
@@ -7957,28 +7848,38 @@
             <a:pPr lvl="1"/>
             <a:r>
               <a:rPr lang="en-US" dirty="0"/>
-              <a:t>1 = currently smokes</a:t>
+              <a:t>1 = 0-99% FPL</a:t>
             </a:r>
           </a:p>
           <a:p>
             <a:pPr lvl="1"/>
             <a:r>
               <a:rPr lang="en-US" dirty="0"/>
-              <a:t>2 = quite smoking</a:t>
+              <a:t>2 = 100 to 199% FPL</a:t>
             </a:r>
           </a:p>
           <a:p>
             <a:pPr lvl="1"/>
             <a:r>
               <a:rPr lang="en-US" dirty="0"/>
-              <a:t>3 = never smoked regularly</a:t>
-            </a:r>
-          </a:p>
-        </p:txBody>
-      </p:sp>
-      <p:sp>
-        <p:nvSpPr>
-          <p:cNvPr id="26" name="Rounded Rectangle 32">
+              <a:t>3 = 200 to 299% FPL</a:t>
+            </a:r>
+          </a:p>
+          <a:p>
+            <a:pPr lvl="1"/>
+            <a:r>
+              <a:rPr lang="en-US" dirty="0"/>
+              <a:t>4 = 300% FPL and above</a:t>
+            </a:r>
+          </a:p>
+          <a:p>
+            <a:endParaRPr lang="en-US" dirty="0"/>
+          </a:p>
+        </p:txBody>
+      </p:sp>
+      <p:sp>
+        <p:nvSpPr>
+          <p:cNvPr id="35" name="Rounded Rectangle 32">
             <a:extLst>
               <a:ext uri="{FF2B5EF4-FFF2-40B4-BE49-F238E27FC236}">
                 <a16:creationId xmlns:a16="http://schemas.microsoft.com/office/drawing/2014/main" id="{E5A9FA1E-7A9B-4CDA-91BB-87575F63E28F}"/>
@@ -8060,16 +7961,16 @@
           <a:lstStyle/>
           <a:p>
             <a:pPr algn="ctr"/>
-            <a:endParaRPr lang="en-US" dirty="0"/>
+            <a:endParaRPr lang="en-US"/>
           </a:p>
         </p:txBody>
       </p:sp>
       <p:pic>
         <p:nvPicPr>
-          <p:cNvPr id="4" name="Content Placeholder 4">
+          <p:cNvPr id="11" name="Picture 10">
             <a:extLst>
               <a:ext uri="{FF2B5EF4-FFF2-40B4-BE49-F238E27FC236}">
-                <a16:creationId xmlns:a16="http://schemas.microsoft.com/office/drawing/2014/main" id="{64865316-D407-A6E4-943B-4CDAF8781DD5}"/>
+                <a16:creationId xmlns:a16="http://schemas.microsoft.com/office/drawing/2014/main" id="{64949A92-D473-5CC9-B67D-C6241AE02243}"/>
               </a:ext>
             </a:extLst>
           </p:cNvPr>
@@ -8086,8 +7987,8 @@
         </p:blipFill>
         <p:spPr>
           <a:xfrm>
-            <a:off x="6891485" y="3517844"/>
-            <a:ext cx="3807350" cy="2636590"/>
+            <a:off x="6805281" y="3340097"/>
+            <a:ext cx="3979759" cy="2636590"/>
           </a:xfrm>
           <a:prstGeom prst="roundRect">
             <a:avLst>
@@ -8103,10 +8004,10 @@
       </p:pic>
       <p:pic>
         <p:nvPicPr>
-          <p:cNvPr id="5" name="Picture 4">
+          <p:cNvPr id="15" name="Picture 14">
             <a:extLst>
               <a:ext uri="{FF2B5EF4-FFF2-40B4-BE49-F238E27FC236}">
-                <a16:creationId xmlns:a16="http://schemas.microsoft.com/office/drawing/2014/main" id="{F3CEB2CB-1143-A46F-95FD-D1E6E90BA51D}"/>
+                <a16:creationId xmlns:a16="http://schemas.microsoft.com/office/drawing/2014/main" id="{5268D125-8F51-50EF-29B7-F30235032F08}"/>
               </a:ext>
             </a:extLst>
           </p:cNvPr>
@@ -8123,8 +8024,8 @@
         </p:blipFill>
         <p:spPr>
           <a:xfrm>
-            <a:off x="6834870" y="890396"/>
-            <a:ext cx="3920579" cy="2636590"/>
+            <a:off x="6735323" y="711578"/>
+            <a:ext cx="4119672" cy="2636590"/>
           </a:xfrm>
           <a:prstGeom prst="roundRect">
             <a:avLst>
@@ -8141,7 +8042,7 @@
     </p:spTree>
     <p:extLst>
       <p:ext uri="{BB962C8B-B14F-4D97-AF65-F5344CB8AC3E}">
-        <p14:creationId xmlns:p14="http://schemas.microsoft.com/office/powerpoint/2010/main" val="4091086867"/>
+        <p14:creationId xmlns:p14="http://schemas.microsoft.com/office/powerpoint/2010/main" val="1693192200"/>
       </p:ext>
     </p:extLst>
   </p:cSld>
@@ -8286,6 +8187,112 @@
 <file path=ppt/slides/slide20.xml><?xml version="1.0" encoding="utf-8"?>
 <p:sld xmlns:a="http://schemas.openxmlformats.org/drawingml/2006/main" xmlns:r="http://schemas.openxmlformats.org/officeDocument/2006/relationships" xmlns:p="http://schemas.openxmlformats.org/presentationml/2006/main">
   <p:cSld>
+    <p:spTree>
+      <p:nvGrpSpPr>
+        <p:cNvPr id="1" name=""/>
+        <p:cNvGrpSpPr/>
+        <p:nvPr/>
+      </p:nvGrpSpPr>
+      <p:grpSpPr>
+        <a:xfrm>
+          <a:off x="0" y="0"/>
+          <a:ext cx="0" cy="0"/>
+          <a:chOff x="0" y="0"/>
+          <a:chExt cx="0" cy="0"/>
+        </a:xfrm>
+      </p:grpSpPr>
+      <p:sp>
+        <p:nvSpPr>
+          <p:cNvPr id="2" name="Title 1">
+            <a:extLst>
+              <a:ext uri="{FF2B5EF4-FFF2-40B4-BE49-F238E27FC236}">
+                <a16:creationId xmlns:a16="http://schemas.microsoft.com/office/drawing/2014/main" id="{B51E01E5-3704-CB28-0009-C15B929458B7}"/>
+              </a:ext>
+            </a:extLst>
+          </p:cNvPr>
+          <p:cNvSpPr>
+            <a:spLocks noGrp="1"/>
+          </p:cNvSpPr>
+          <p:nvPr>
+            <p:ph type="title"/>
+          </p:nvPr>
+        </p:nvSpPr>
+        <p:spPr/>
+        <p:txBody>
+          <a:bodyPr/>
+          <a:lstStyle/>
+          <a:p>
+            <a:r>
+              <a:rPr lang="en-US" dirty="0"/>
+              <a:t>Prepare – visualization </a:t>
+            </a:r>
+          </a:p>
+        </p:txBody>
+      </p:sp>
+      <p:sp>
+        <p:nvSpPr>
+          <p:cNvPr id="3" name="Content Placeholder 2">
+            <a:extLst>
+              <a:ext uri="{FF2B5EF4-FFF2-40B4-BE49-F238E27FC236}">
+                <a16:creationId xmlns:a16="http://schemas.microsoft.com/office/drawing/2014/main" id="{952534FD-3E84-A1BD-3ABF-570358079C7D}"/>
+              </a:ext>
+            </a:extLst>
+          </p:cNvPr>
+          <p:cNvSpPr>
+            <a:spLocks noGrp="1"/>
+          </p:cNvSpPr>
+          <p:nvPr>
+            <p:ph idx="1"/>
+          </p:nvPr>
+        </p:nvSpPr>
+        <p:spPr/>
+        <p:txBody>
+          <a:bodyPr/>
+          <a:lstStyle/>
+          <a:p>
+            <a:r>
+              <a:rPr lang="en-US" u="sng" dirty="0"/>
+              <a:t>Observations – POVERTY</a:t>
+            </a:r>
+            <a:r>
+              <a:rPr lang="en-US" dirty="0"/>
+              <a:t>:  Distribution is not normal.  Merely pointing out if an algorithm is used that assumes normal distribution.  </a:t>
+            </a:r>
+          </a:p>
+          <a:p>
+            <a:r>
+              <a:rPr lang="en-US" dirty="0"/>
+              <a:t>Histogram and boxplot confirms skew, confirming lack of normality in distribution</a:t>
+            </a:r>
+          </a:p>
+          <a:p>
+            <a:r>
+              <a:rPr lang="en-US" dirty="0"/>
+              <a:t>Income is generally ordinal, because poverty levels is based on Federal Poverty Levels, which is a measure of income, this distribution may have an ordinal component.  This may determine the type of algorithm, or may require specific testing.  </a:t>
+            </a:r>
+          </a:p>
+          <a:p>
+            <a:pPr lvl="1"/>
+            <a:endParaRPr lang="en-US" dirty="0"/>
+          </a:p>
+        </p:txBody>
+      </p:sp>
+    </p:spTree>
+    <p:extLst>
+      <p:ext uri="{BB962C8B-B14F-4D97-AF65-F5344CB8AC3E}">
+        <p14:creationId xmlns:p14="http://schemas.microsoft.com/office/powerpoint/2010/main" val="1217999325"/>
+      </p:ext>
+    </p:extLst>
+  </p:cSld>
+  <p:clrMapOvr>
+    <a:masterClrMapping/>
+  </p:clrMapOvr>
+</p:sld>
+</file>
+
+<file path=ppt/slides/slide21.xml><?xml version="1.0" encoding="utf-8"?>
+<p:sld xmlns:a="http://schemas.openxmlformats.org/drawingml/2006/main" xmlns:r="http://schemas.openxmlformats.org/officeDocument/2006/relationships" xmlns:p="http://schemas.openxmlformats.org/presentationml/2006/main">
+  <p:cSld>
     <p:bg>
       <p:bgPr>
         <a:blipFill>
@@ -8314,7 +8321,7 @@
           <p:cNvPr id="2" name="Title 1">
             <a:extLst>
               <a:ext uri="{FF2B5EF4-FFF2-40B4-BE49-F238E27FC236}">
-                <a16:creationId xmlns:a16="http://schemas.microsoft.com/office/drawing/2014/main" id="{6DDC1F3D-F249-74C1-D04C-B7AF947470C4}"/>
+                <a16:creationId xmlns:a16="http://schemas.microsoft.com/office/drawing/2014/main" id="{83776FF5-8955-6F73-4193-6E1275F9A237}"/>
               </a:ext>
             </a:extLst>
           </p:cNvPr>
@@ -8343,15 +8350,16 @@
               </a:lnSpc>
             </a:pPr>
             <a:r>
-              <a:rPr lang="en-US" sz="3300" dirty="0"/>
+              <a:rPr lang="en-US" sz="3300"/>
               <a:t>Prepare - visualization</a:t>
             </a:r>
-          </a:p>
-        </p:txBody>
-      </p:sp>
-      <p:sp>
-        <p:nvSpPr>
-          <p:cNvPr id="12" name="Rectangle 11">
+            <a:endParaRPr lang="en-US" sz="3300" dirty="0"/>
+          </a:p>
+        </p:txBody>
+      </p:sp>
+      <p:sp>
+        <p:nvSpPr>
+          <p:cNvPr id="46" name="Rectangle 39">
             <a:extLst>
               <a:ext uri="{FF2B5EF4-FFF2-40B4-BE49-F238E27FC236}">
                 <a16:creationId xmlns:a16="http://schemas.microsoft.com/office/drawing/2014/main" id="{1C04857D-B1C1-41ED-B1B4-E3D6E3C7C4E6}"/>
@@ -8411,7 +8419,7 @@
           <a:lstStyle/>
           <a:p>
             <a:pPr algn="ctr"/>
-            <a:endParaRPr lang="en-US" dirty="0"/>
+            <a:endParaRPr lang="en-US"/>
           </a:p>
         </p:txBody>
       </p:sp>
@@ -8420,7 +8428,7 @@
           <p:cNvPr id="3" name="Content Placeholder 2">
             <a:extLst>
               <a:ext uri="{FF2B5EF4-FFF2-40B4-BE49-F238E27FC236}">
-                <a16:creationId xmlns:a16="http://schemas.microsoft.com/office/drawing/2014/main" id="{B72517D3-9096-431C-E4CA-7939E03B557E}"/>
+                <a16:creationId xmlns:a16="http://schemas.microsoft.com/office/drawing/2014/main" id="{5D579FFF-C95B-B04E-ABF3-99801746C7B4}"/>
               </a:ext>
             </a:extLst>
           </p:cNvPr>
@@ -8439,110 +8447,53 @@
         </p:spPr>
         <p:txBody>
           <a:bodyPr>
-            <a:normAutofit lnSpcReduction="10000"/>
+            <a:normAutofit/>
           </a:bodyPr>
           <a:lstStyle/>
           <a:p>
-            <a:pPr>
-              <a:lnSpc>
-                <a:spcPct val="90000"/>
-              </a:lnSpc>
-            </a:pPr>
-            <a:r>
-              <a:rPr lang="en-US" sz="1700" dirty="0"/>
-              <a:t>Histogram of GENERAL HEALTH and box plot of DEPRESSION vs GENERAL HEALTH , either right skew or might be normal.  Difficult to determine.</a:t>
-            </a:r>
-          </a:p>
-          <a:p>
-            <a:pPr>
-              <a:lnSpc>
-                <a:spcPct val="90000"/>
-              </a:lnSpc>
-            </a:pPr>
-            <a:r>
-              <a:rPr lang="en-US" sz="1700" dirty="0"/>
-              <a:t>General Health Condition</a:t>
-            </a:r>
-          </a:p>
-          <a:p>
-            <a:pPr>
-              <a:lnSpc>
-                <a:spcPct val="90000"/>
-              </a:lnSpc>
-            </a:pPr>
-            <a:r>
-              <a:rPr lang="en-US" sz="1700" dirty="0"/>
+            <a:r>
+              <a:rPr lang="en-US" dirty="0"/>
+              <a:t>Histogram &amp; Boxplot of SMOKING.  Left Skew.</a:t>
+            </a:r>
+          </a:p>
+          <a:p>
+            <a:r>
+              <a:rPr lang="en-US" dirty="0"/>
+              <a:t>Current smoking habits</a:t>
+            </a:r>
+          </a:p>
+          <a:p>
+            <a:r>
+              <a:rPr lang="en-US" dirty="0"/>
               <a:t>Coding</a:t>
             </a:r>
           </a:p>
           <a:p>
-            <a:pPr lvl="1">
-              <a:lnSpc>
-                <a:spcPct val="90000"/>
-              </a:lnSpc>
-            </a:pPr>
-            <a:r>
-              <a:rPr lang="en-US" sz="1700" dirty="0"/>
-              <a:t>1 = excellent</a:t>
-            </a:r>
-          </a:p>
-          <a:p>
-            <a:pPr lvl="1">
-              <a:lnSpc>
-                <a:spcPct val="90000"/>
-              </a:lnSpc>
-            </a:pPr>
-            <a:r>
-              <a:rPr lang="en-US" sz="1700" dirty="0"/>
-              <a:t>2 = very good</a:t>
-            </a:r>
-          </a:p>
-          <a:p>
-            <a:pPr lvl="1">
-              <a:lnSpc>
-                <a:spcPct val="90000"/>
-              </a:lnSpc>
-            </a:pPr>
-            <a:r>
-              <a:rPr lang="en-US" sz="1700" dirty="0"/>
-              <a:t>3 = good</a:t>
-            </a:r>
-          </a:p>
-          <a:p>
-            <a:pPr lvl="1">
-              <a:lnSpc>
-                <a:spcPct val="90000"/>
-              </a:lnSpc>
-            </a:pPr>
-            <a:r>
-              <a:rPr lang="en-US" sz="1700" dirty="0"/>
-              <a:t>4 = fair</a:t>
-            </a:r>
-          </a:p>
-          <a:p>
-            <a:pPr lvl="1">
-              <a:lnSpc>
-                <a:spcPct val="90000"/>
-              </a:lnSpc>
-            </a:pPr>
-            <a:r>
-              <a:rPr lang="en-US" sz="1700" dirty="0"/>
-              <a:t>5 = poor</a:t>
-            </a:r>
-          </a:p>
-          <a:p>
-            <a:pPr>
-              <a:lnSpc>
-                <a:spcPct val="90000"/>
-              </a:lnSpc>
-            </a:pPr>
-            <a:endParaRPr lang="en-US" sz="1700" dirty="0"/>
-          </a:p>
-        </p:txBody>
-      </p:sp>
-      <p:sp>
-        <p:nvSpPr>
-          <p:cNvPr id="14" name="Rounded Rectangle 32">
+            <a:pPr lvl="1"/>
+            <a:r>
+              <a:rPr lang="en-US" dirty="0"/>
+              <a:t>1 = currently smokes</a:t>
+            </a:r>
+          </a:p>
+          <a:p>
+            <a:pPr lvl="1"/>
+            <a:r>
+              <a:rPr lang="en-US" dirty="0"/>
+              <a:t>2 = quite smoking</a:t>
+            </a:r>
+          </a:p>
+          <a:p>
+            <a:pPr lvl="1"/>
+            <a:r>
+              <a:rPr lang="en-US" dirty="0"/>
+              <a:t>3 = never smoked regularly</a:t>
+            </a:r>
+          </a:p>
+        </p:txBody>
+      </p:sp>
+      <p:sp>
+        <p:nvSpPr>
+          <p:cNvPr id="47" name="Rounded Rectangle 32">
             <a:extLst>
               <a:ext uri="{FF2B5EF4-FFF2-40B4-BE49-F238E27FC236}">
                 <a16:creationId xmlns:a16="http://schemas.microsoft.com/office/drawing/2014/main" id="{E5A9FA1E-7A9B-4CDA-91BB-87575F63E28F}"/>
@@ -8624,16 +8575,16 @@
           <a:lstStyle/>
           <a:p>
             <a:pPr algn="ctr"/>
-            <a:endParaRPr lang="en-US" dirty="0"/>
+            <a:endParaRPr lang="en-US"/>
           </a:p>
         </p:txBody>
       </p:sp>
       <p:pic>
         <p:nvPicPr>
-          <p:cNvPr id="7" name="Picture 6">
+          <p:cNvPr id="11" name="Picture 10">
             <a:extLst>
               <a:ext uri="{FF2B5EF4-FFF2-40B4-BE49-F238E27FC236}">
-                <a16:creationId xmlns:a16="http://schemas.microsoft.com/office/drawing/2014/main" id="{10762282-1BD7-86EB-A858-6BD4AA45AEB1}"/>
+                <a16:creationId xmlns:a16="http://schemas.microsoft.com/office/drawing/2014/main" id="{4217E1BB-4BED-21F2-F9A0-546955EF0DC8}"/>
               </a:ext>
             </a:extLst>
           </p:cNvPr>
@@ -8650,8 +8601,8 @@
         </p:blipFill>
         <p:spPr>
           <a:xfrm>
-            <a:off x="6877641" y="733077"/>
-            <a:ext cx="3835039" cy="2636590"/>
+            <a:off x="6905132" y="733077"/>
+            <a:ext cx="3780057" cy="2636590"/>
           </a:xfrm>
           <a:prstGeom prst="roundRect">
             <a:avLst>
@@ -8667,10 +8618,10 @@
       </p:pic>
       <p:pic>
         <p:nvPicPr>
-          <p:cNvPr id="5" name="Picture 4">
+          <p:cNvPr id="13" name="Picture 12">
             <a:extLst>
               <a:ext uri="{FF2B5EF4-FFF2-40B4-BE49-F238E27FC236}">
-                <a16:creationId xmlns:a16="http://schemas.microsoft.com/office/drawing/2014/main" id="{653E9426-F9DF-64EA-FD6F-EC892299B3EE}"/>
+                <a16:creationId xmlns:a16="http://schemas.microsoft.com/office/drawing/2014/main" id="{9B29BECC-FFB4-08DF-EEC6-D4CD17EC524A}"/>
               </a:ext>
             </a:extLst>
           </p:cNvPr>
@@ -8687,8 +8638,8 @@
         </p:blipFill>
         <p:spPr>
           <a:xfrm>
-            <a:off x="6856491" y="3483966"/>
-            <a:ext cx="3877337" cy="2636590"/>
+            <a:off x="6759182" y="3483966"/>
+            <a:ext cx="4071954" cy="2636590"/>
           </a:xfrm>
           <a:prstGeom prst="roundRect">
             <a:avLst>
@@ -8705,7 +8656,730 @@
     </p:spTree>
     <p:extLst>
       <p:ext uri="{BB962C8B-B14F-4D97-AF65-F5344CB8AC3E}">
+        <p14:creationId xmlns:p14="http://schemas.microsoft.com/office/powerpoint/2010/main" val="4091086867"/>
+      </p:ext>
+    </p:extLst>
+  </p:cSld>
+  <p:clrMapOvr>
+    <a:masterClrMapping/>
+  </p:clrMapOvr>
+</p:sld>
+</file>
+
+<file path=ppt/slides/slide22.xml><?xml version="1.0" encoding="utf-8"?>
+<p:sld xmlns:a="http://schemas.openxmlformats.org/drawingml/2006/main" xmlns:r="http://schemas.openxmlformats.org/officeDocument/2006/relationships" xmlns:p="http://schemas.openxmlformats.org/presentationml/2006/main">
+  <p:cSld>
+    <p:spTree>
+      <p:nvGrpSpPr>
+        <p:cNvPr id="1" name=""/>
+        <p:cNvGrpSpPr/>
+        <p:nvPr/>
+      </p:nvGrpSpPr>
+      <p:grpSpPr>
+        <a:xfrm>
+          <a:off x="0" y="0"/>
+          <a:ext cx="0" cy="0"/>
+          <a:chOff x="0" y="0"/>
+          <a:chExt cx="0" cy="0"/>
+        </a:xfrm>
+      </p:grpSpPr>
+      <p:sp>
+        <p:nvSpPr>
+          <p:cNvPr id="2" name="Title 1">
+            <a:extLst>
+              <a:ext uri="{FF2B5EF4-FFF2-40B4-BE49-F238E27FC236}">
+                <a16:creationId xmlns:a16="http://schemas.microsoft.com/office/drawing/2014/main" id="{3BAD1D73-4831-9BBA-27B7-44B34FFB9717}"/>
+              </a:ext>
+            </a:extLst>
+          </p:cNvPr>
+          <p:cNvSpPr>
+            <a:spLocks noGrp="1"/>
+          </p:cNvSpPr>
+          <p:nvPr>
+            <p:ph type="title"/>
+          </p:nvPr>
+        </p:nvSpPr>
+        <p:spPr/>
+        <p:txBody>
+          <a:bodyPr/>
+          <a:lstStyle/>
+          <a:p>
+            <a:r>
+              <a:rPr lang="en-US" dirty="0"/>
+              <a:t>Prepare – visualization </a:t>
+            </a:r>
+          </a:p>
+        </p:txBody>
+      </p:sp>
+      <p:sp>
+        <p:nvSpPr>
+          <p:cNvPr id="3" name="Content Placeholder 2">
+            <a:extLst>
+              <a:ext uri="{FF2B5EF4-FFF2-40B4-BE49-F238E27FC236}">
+                <a16:creationId xmlns:a16="http://schemas.microsoft.com/office/drawing/2014/main" id="{1658742F-8BBF-FF1C-45D0-808A6611DD3B}"/>
+              </a:ext>
+            </a:extLst>
+          </p:cNvPr>
+          <p:cNvSpPr>
+            <a:spLocks noGrp="1"/>
+          </p:cNvSpPr>
+          <p:nvPr>
+            <p:ph idx="1"/>
+          </p:nvPr>
+        </p:nvSpPr>
+        <p:spPr/>
+        <p:txBody>
+          <a:bodyPr/>
+          <a:lstStyle/>
+          <a:p>
+            <a:r>
+              <a:rPr lang="en-US" u="sng" dirty="0"/>
+              <a:t>Observations – SMOKING</a:t>
+            </a:r>
+            <a:r>
+              <a:rPr lang="en-US" dirty="0"/>
+              <a:t>:  As before, histogram and box plot shows left skew.  This is not as important as this is not out exposure variable.  </a:t>
+            </a:r>
+          </a:p>
+        </p:txBody>
+      </p:sp>
+    </p:spTree>
+    <p:extLst>
+      <p:ext uri="{BB962C8B-B14F-4D97-AF65-F5344CB8AC3E}">
+        <p14:creationId xmlns:p14="http://schemas.microsoft.com/office/powerpoint/2010/main" val="2938660089"/>
+      </p:ext>
+    </p:extLst>
+  </p:cSld>
+  <p:clrMapOvr>
+    <a:masterClrMapping/>
+  </p:clrMapOvr>
+</p:sld>
+</file>
+
+<file path=ppt/slides/slide23.xml><?xml version="1.0" encoding="utf-8"?>
+<p:sld xmlns:a="http://schemas.openxmlformats.org/drawingml/2006/main" xmlns:r="http://schemas.openxmlformats.org/officeDocument/2006/relationships" xmlns:p="http://schemas.openxmlformats.org/presentationml/2006/main">
+  <p:cSld>
+    <p:bg>
+      <p:bgPr>
+        <a:blipFill>
+          <a:blip r:embed="rId2"/>
+          <a:stretch/>
+        </a:blipFill>
+        <a:effectLst/>
+      </p:bgPr>
+    </p:bg>
+    <p:spTree>
+      <p:nvGrpSpPr>
+        <p:cNvPr id="1" name=""/>
+        <p:cNvGrpSpPr/>
+        <p:nvPr/>
+      </p:nvGrpSpPr>
+      <p:grpSpPr>
+        <a:xfrm>
+          <a:off x="0" y="0"/>
+          <a:ext cx="0" cy="0"/>
+          <a:chOff x="0" y="0"/>
+          <a:chExt cx="0" cy="0"/>
+        </a:xfrm>
+      </p:grpSpPr>
+      <p:sp>
+        <p:nvSpPr>
+          <p:cNvPr id="2" name="Title 1">
+            <a:extLst>
+              <a:ext uri="{FF2B5EF4-FFF2-40B4-BE49-F238E27FC236}">
+                <a16:creationId xmlns:a16="http://schemas.microsoft.com/office/drawing/2014/main" id="{6DDC1F3D-F249-74C1-D04C-B7AF947470C4}"/>
+              </a:ext>
+            </a:extLst>
+          </p:cNvPr>
+          <p:cNvSpPr>
+            <a:spLocks noGrp="1"/>
+          </p:cNvSpPr>
+          <p:nvPr>
+            <p:ph type="title"/>
+          </p:nvPr>
+        </p:nvSpPr>
+        <p:spPr>
+          <a:xfrm>
+            <a:off x="1361187" y="1030288"/>
+            <a:ext cx="4099947" cy="1035579"/>
+          </a:xfrm>
+        </p:spPr>
+        <p:txBody>
+          <a:bodyPr>
+            <a:normAutofit/>
+          </a:bodyPr>
+          <a:lstStyle/>
+          <a:p>
+            <a:pPr>
+              <a:lnSpc>
+                <a:spcPct val="90000"/>
+              </a:lnSpc>
+            </a:pPr>
+            <a:r>
+              <a:rPr lang="en-US" sz="3300" dirty="0"/>
+              <a:t>Prepare - visualization</a:t>
+            </a:r>
+          </a:p>
+        </p:txBody>
+      </p:sp>
+      <p:sp>
+        <p:nvSpPr>
+          <p:cNvPr id="28" name="Rectangle 27">
+            <a:extLst>
+              <a:ext uri="{FF2B5EF4-FFF2-40B4-BE49-F238E27FC236}">
+                <a16:creationId xmlns:a16="http://schemas.microsoft.com/office/drawing/2014/main" id="{1C04857D-B1C1-41ED-B1B4-E3D6E3C7C4E6}"/>
+              </a:ext>
+              <a:ext uri="{C183D7F6-B498-43B3-948B-1728B52AA6E4}">
+                <adec:decorative xmlns:adec="http://schemas.microsoft.com/office/drawing/2017/decorative" val="1"/>
+              </a:ext>
+            </a:extLst>
+          </p:cNvPr>
+          <p:cNvSpPr>
+            <a:spLocks noGrp="1" noRot="1" noChangeAspect="1" noMove="1" noResize="1" noEditPoints="1" noAdjustHandles="1" noChangeArrowheads="1" noChangeShapeType="1" noTextEdit="1"/>
+          </p:cNvSpPr>
+          <p:nvPr>
+            <p:extLst>
+              <p:ext uri="{386F3935-93C4-4BCD-93E2-E3B085C9AB24}">
+                <p16:designElem xmlns:p16="http://schemas.microsoft.com/office/powerpoint/2015/main" val="1"/>
+              </p:ext>
+            </p:extLst>
+          </p:nvPr>
+        </p:nvSpPr>
+        <p:spPr>
+          <a:xfrm rot="16200000">
+            <a:off x="-1797333" y="4261157"/>
+            <a:ext cx="2971800" cy="170837"/>
+          </a:xfrm>
+          <a:prstGeom prst="rect">
+            <a:avLst/>
+          </a:prstGeom>
+          <a:solidFill>
+            <a:schemeClr val="accent3">
+              <a:lumMod val="60000"/>
+              <a:lumOff val="40000"/>
+            </a:schemeClr>
+          </a:solidFill>
+          <a:ln>
+            <a:noFill/>
+          </a:ln>
+        </p:spPr>
+        <p:style>
+          <a:lnRef idx="2">
+            <a:schemeClr val="accent1">
+              <a:shade val="50000"/>
+            </a:schemeClr>
+          </a:lnRef>
+          <a:fillRef idx="1">
+            <a:schemeClr val="accent1"/>
+          </a:fillRef>
+          <a:effectRef idx="0">
+            <a:schemeClr val="accent1"/>
+          </a:effectRef>
+          <a:fontRef idx="minor">
+            <a:schemeClr val="lt1"/>
+          </a:fontRef>
+        </p:style>
+        <p:txBody>
+          <a:bodyPr rtlCol="0" anchor="ctr"/>
+          <a:lstStyle/>
+          <a:p>
+            <a:pPr algn="ctr"/>
+            <a:endParaRPr lang="en-US"/>
+          </a:p>
+        </p:txBody>
+      </p:sp>
+      <p:sp>
+        <p:nvSpPr>
+          <p:cNvPr id="3" name="Content Placeholder 2">
+            <a:extLst>
+              <a:ext uri="{FF2B5EF4-FFF2-40B4-BE49-F238E27FC236}">
+                <a16:creationId xmlns:a16="http://schemas.microsoft.com/office/drawing/2014/main" id="{B72517D3-9096-431C-E4CA-7939E03B557E}"/>
+              </a:ext>
+            </a:extLst>
+          </p:cNvPr>
+          <p:cNvSpPr>
+            <a:spLocks noGrp="1"/>
+          </p:cNvSpPr>
+          <p:nvPr>
+            <p:ph idx="1"/>
+          </p:nvPr>
+        </p:nvSpPr>
+        <p:spPr>
+          <a:xfrm>
+            <a:off x="1361187" y="2142067"/>
+            <a:ext cx="4099947" cy="3649133"/>
+          </a:xfrm>
+        </p:spPr>
+        <p:txBody>
+          <a:bodyPr>
+            <a:normAutofit/>
+          </a:bodyPr>
+          <a:lstStyle/>
+          <a:p>
+            <a:pPr>
+              <a:lnSpc>
+                <a:spcPct val="90000"/>
+              </a:lnSpc>
+            </a:pPr>
+            <a:r>
+              <a:rPr lang="en-US" dirty="0"/>
+              <a:t>Histogram &amp; Boxplot GENERAL HEALTH, either right skew or might be normal.  Difficult to determine.</a:t>
+            </a:r>
+          </a:p>
+          <a:p>
+            <a:pPr>
+              <a:lnSpc>
+                <a:spcPct val="90000"/>
+              </a:lnSpc>
+            </a:pPr>
+            <a:r>
+              <a:rPr lang="en-US" dirty="0"/>
+              <a:t>General Health Condition</a:t>
+            </a:r>
+          </a:p>
+          <a:p>
+            <a:pPr>
+              <a:lnSpc>
+                <a:spcPct val="90000"/>
+              </a:lnSpc>
+            </a:pPr>
+            <a:r>
+              <a:rPr lang="en-US" dirty="0"/>
+              <a:t>Coding</a:t>
+            </a:r>
+          </a:p>
+          <a:p>
+            <a:pPr lvl="1">
+              <a:lnSpc>
+                <a:spcPct val="90000"/>
+              </a:lnSpc>
+            </a:pPr>
+            <a:r>
+              <a:rPr lang="en-US" dirty="0"/>
+              <a:t>1 = excellent</a:t>
+            </a:r>
+          </a:p>
+          <a:p>
+            <a:pPr lvl="1">
+              <a:lnSpc>
+                <a:spcPct val="90000"/>
+              </a:lnSpc>
+            </a:pPr>
+            <a:r>
+              <a:rPr lang="en-US" dirty="0"/>
+              <a:t>2 = very good</a:t>
+            </a:r>
+          </a:p>
+          <a:p>
+            <a:pPr lvl="1">
+              <a:lnSpc>
+                <a:spcPct val="90000"/>
+              </a:lnSpc>
+            </a:pPr>
+            <a:r>
+              <a:rPr lang="en-US" dirty="0"/>
+              <a:t>3 = good</a:t>
+            </a:r>
+          </a:p>
+          <a:p>
+            <a:pPr lvl="1">
+              <a:lnSpc>
+                <a:spcPct val="90000"/>
+              </a:lnSpc>
+            </a:pPr>
+            <a:r>
+              <a:rPr lang="en-US" dirty="0"/>
+              <a:t>4 = fair</a:t>
+            </a:r>
+          </a:p>
+          <a:p>
+            <a:pPr lvl="1">
+              <a:lnSpc>
+                <a:spcPct val="90000"/>
+              </a:lnSpc>
+            </a:pPr>
+            <a:r>
+              <a:rPr lang="en-US" dirty="0"/>
+              <a:t>5 = poor</a:t>
+            </a:r>
+          </a:p>
+          <a:p>
+            <a:pPr>
+              <a:lnSpc>
+                <a:spcPct val="90000"/>
+              </a:lnSpc>
+            </a:pPr>
+            <a:endParaRPr lang="en-US" dirty="0"/>
+          </a:p>
+        </p:txBody>
+      </p:sp>
+      <p:sp>
+        <p:nvSpPr>
+          <p:cNvPr id="30" name="Rounded Rectangle 32">
+            <a:extLst>
+              <a:ext uri="{FF2B5EF4-FFF2-40B4-BE49-F238E27FC236}">
+                <a16:creationId xmlns:a16="http://schemas.microsoft.com/office/drawing/2014/main" id="{E5A9FA1E-7A9B-4CDA-91BB-87575F63E28F}"/>
+              </a:ext>
+              <a:ext uri="{C183D7F6-B498-43B3-948B-1728B52AA6E4}">
+                <adec:decorative xmlns:adec="http://schemas.microsoft.com/office/drawing/2017/decorative" val="1"/>
+              </a:ext>
+            </a:extLst>
+          </p:cNvPr>
+          <p:cNvSpPr>
+            <a:spLocks noGrp="1" noRot="1" noChangeAspect="1" noMove="1" noResize="1" noEditPoints="1" noAdjustHandles="1" noChangeArrowheads="1" noChangeShapeType="1" noTextEdit="1"/>
+          </p:cNvSpPr>
+          <p:nvPr>
+            <p:extLst>
+              <p:ext uri="{386F3935-93C4-4BCD-93E2-E3B085C9AB24}">
+                <p16:designElem xmlns:p16="http://schemas.microsoft.com/office/powerpoint/2015/main" val="1"/>
+              </p:ext>
+            </p:extLst>
+          </p:nvPr>
+        </p:nvSpPr>
+        <p:spPr>
+          <a:xfrm>
+            <a:off x="6082585" y="639097"/>
+            <a:ext cx="5433751" cy="5575438"/>
+          </a:xfrm>
+          <a:prstGeom prst="roundRect">
+            <a:avLst>
+              <a:gd name="adj" fmla="val 3449"/>
+            </a:avLst>
+          </a:prstGeom>
+          <a:solidFill>
+            <a:schemeClr val="tx1"/>
+          </a:solidFill>
+          <a:ln w="50800" cap="sq" cmpd="dbl">
+            <a:gradFill flip="none" rotWithShape="1">
+              <a:gsLst>
+                <a:gs pos="0">
+                  <a:srgbClr val="FFFFFF"/>
+                </a:gs>
+                <a:gs pos="100000">
+                  <a:schemeClr val="tx1">
+                    <a:alpha val="0"/>
+                  </a:schemeClr>
+                </a:gs>
+              </a:gsLst>
+              <a:path path="circle">
+                <a:fillToRect l="50000" t="50000" r="50000" b="50000"/>
+              </a:path>
+              <a:tileRect/>
+            </a:gradFill>
+            <a:miter lim="800000"/>
+          </a:ln>
+          <a:effectLst>
+            <a:outerShdw blurRad="254000" algn="tl" rotWithShape="0">
+              <a:srgbClr val="000000">
+                <a:alpha val="43000"/>
+              </a:srgbClr>
+            </a:outerShdw>
+          </a:effectLst>
+        </p:spPr>
+        <p:style>
+          <a:lnRef idx="2">
+            <a:schemeClr val="accent1">
+              <a:shade val="50000"/>
+            </a:schemeClr>
+          </a:lnRef>
+          <a:fillRef idx="1">
+            <a:schemeClr val="accent1"/>
+          </a:fillRef>
+          <a:effectRef idx="0">
+            <a:schemeClr val="accent1"/>
+          </a:effectRef>
+          <a:fontRef idx="minor">
+            <a:schemeClr val="lt1"/>
+          </a:fontRef>
+        </p:style>
+        <p:txBody>
+          <a:bodyPr rtlCol="0" anchor="ctr"/>
+          <a:lstStyle/>
+          <a:p>
+            <a:pPr algn="ctr"/>
+            <a:endParaRPr lang="en-US"/>
+          </a:p>
+        </p:txBody>
+      </p:sp>
+      <p:pic>
+        <p:nvPicPr>
+          <p:cNvPr id="11" name="Picture 10">
+            <a:extLst>
+              <a:ext uri="{FF2B5EF4-FFF2-40B4-BE49-F238E27FC236}">
+                <a16:creationId xmlns:a16="http://schemas.microsoft.com/office/drawing/2014/main" id="{A132ED4F-EBF5-DE4F-0929-2C0380FC6D97}"/>
+              </a:ext>
+            </a:extLst>
+          </p:cNvPr>
+          <p:cNvPicPr>
+            <a:picLocks noChangeAspect="1"/>
+          </p:cNvPicPr>
+          <p:nvPr/>
+        </p:nvPicPr>
+        <p:blipFill>
+          <a:blip r:embed="rId3"/>
+          <a:stretch>
+            <a:fillRect/>
+          </a:stretch>
+        </p:blipFill>
+        <p:spPr>
+          <a:xfrm>
+            <a:off x="6884588" y="733077"/>
+            <a:ext cx="3821145" cy="2636590"/>
+          </a:xfrm>
+          <a:prstGeom prst="roundRect">
+            <a:avLst>
+              <a:gd name="adj" fmla="val 4207"/>
+            </a:avLst>
+          </a:prstGeom>
+          <a:ln w="50800" cap="sq" cmpd="dbl">
+            <a:noFill/>
+            <a:miter lim="800000"/>
+          </a:ln>
+          <a:effectLst/>
+        </p:spPr>
+      </p:pic>
+      <p:pic>
+        <p:nvPicPr>
+          <p:cNvPr id="15" name="Picture 14">
+            <a:extLst>
+              <a:ext uri="{FF2B5EF4-FFF2-40B4-BE49-F238E27FC236}">
+                <a16:creationId xmlns:a16="http://schemas.microsoft.com/office/drawing/2014/main" id="{598A7B0D-CE3D-3DCE-0330-39EFDF1788CA}"/>
+              </a:ext>
+            </a:extLst>
+          </p:cNvPr>
+          <p:cNvPicPr>
+            <a:picLocks noChangeAspect="1"/>
+          </p:cNvPicPr>
+          <p:nvPr/>
+        </p:nvPicPr>
+        <p:blipFill>
+          <a:blip r:embed="rId4"/>
+          <a:stretch>
+            <a:fillRect/>
+          </a:stretch>
+        </p:blipFill>
+        <p:spPr>
+          <a:xfrm>
+            <a:off x="6812761" y="3483966"/>
+            <a:ext cx="3964796" cy="2636590"/>
+          </a:xfrm>
+          <a:prstGeom prst="roundRect">
+            <a:avLst>
+              <a:gd name="adj" fmla="val 4528"/>
+            </a:avLst>
+          </a:prstGeom>
+          <a:ln w="50800" cap="sq" cmpd="dbl">
+            <a:noFill/>
+            <a:miter lim="800000"/>
+          </a:ln>
+          <a:effectLst/>
+        </p:spPr>
+      </p:pic>
+    </p:spTree>
+    <p:extLst>
+      <p:ext uri="{BB962C8B-B14F-4D97-AF65-F5344CB8AC3E}">
         <p14:creationId xmlns:p14="http://schemas.microsoft.com/office/powerpoint/2010/main" val="784685838"/>
+      </p:ext>
+    </p:extLst>
+  </p:cSld>
+  <p:clrMapOvr>
+    <a:masterClrMapping/>
+  </p:clrMapOvr>
+</p:sld>
+</file>
+
+<file path=ppt/slides/slide24.xml><?xml version="1.0" encoding="utf-8"?>
+<p:sld xmlns:a="http://schemas.openxmlformats.org/drawingml/2006/main" xmlns:r="http://schemas.openxmlformats.org/officeDocument/2006/relationships" xmlns:p="http://schemas.openxmlformats.org/presentationml/2006/main">
+  <p:cSld>
+    <p:spTree>
+      <p:nvGrpSpPr>
+        <p:cNvPr id="1" name=""/>
+        <p:cNvGrpSpPr/>
+        <p:nvPr/>
+      </p:nvGrpSpPr>
+      <p:grpSpPr>
+        <a:xfrm>
+          <a:off x="0" y="0"/>
+          <a:ext cx="0" cy="0"/>
+          <a:chOff x="0" y="0"/>
+          <a:chExt cx="0" cy="0"/>
+        </a:xfrm>
+      </p:grpSpPr>
+      <p:sp>
+        <p:nvSpPr>
+          <p:cNvPr id="2" name="Title 1">
+            <a:extLst>
+              <a:ext uri="{FF2B5EF4-FFF2-40B4-BE49-F238E27FC236}">
+                <a16:creationId xmlns:a16="http://schemas.microsoft.com/office/drawing/2014/main" id="{45833310-A7F8-2803-763E-57F3FC460DA8}"/>
+              </a:ext>
+            </a:extLst>
+          </p:cNvPr>
+          <p:cNvSpPr>
+            <a:spLocks noGrp="1"/>
+          </p:cNvSpPr>
+          <p:nvPr>
+            <p:ph type="title"/>
+          </p:nvPr>
+        </p:nvSpPr>
+        <p:spPr/>
+        <p:txBody>
+          <a:bodyPr/>
+          <a:lstStyle/>
+          <a:p>
+            <a:r>
+              <a:rPr lang="en-US" dirty="0"/>
+              <a:t>Prepare – visualization </a:t>
+            </a:r>
+          </a:p>
+        </p:txBody>
+      </p:sp>
+      <p:sp>
+        <p:nvSpPr>
+          <p:cNvPr id="3" name="Content Placeholder 2">
+            <a:extLst>
+              <a:ext uri="{FF2B5EF4-FFF2-40B4-BE49-F238E27FC236}">
+                <a16:creationId xmlns:a16="http://schemas.microsoft.com/office/drawing/2014/main" id="{E955C35C-A737-698C-FB56-00A292B6EAAA}"/>
+              </a:ext>
+            </a:extLst>
+          </p:cNvPr>
+          <p:cNvSpPr>
+            <a:spLocks noGrp="1"/>
+          </p:cNvSpPr>
+          <p:nvPr>
+            <p:ph idx="1"/>
+          </p:nvPr>
+        </p:nvSpPr>
+        <p:spPr/>
+        <p:txBody>
+          <a:bodyPr/>
+          <a:lstStyle/>
+          <a:p>
+            <a:r>
+              <a:rPr lang="en-US" u="sng" dirty="0"/>
+              <a:t>Observations – GENERAL HEALTH</a:t>
+            </a:r>
+            <a:r>
+              <a:rPr lang="en-US" dirty="0"/>
+              <a:t>:  Boxplot and Histogram show that distribution may be normal.  </a:t>
+            </a:r>
+          </a:p>
+        </p:txBody>
+      </p:sp>
+    </p:spTree>
+    <p:extLst>
+      <p:ext uri="{BB962C8B-B14F-4D97-AF65-F5344CB8AC3E}">
+        <p14:creationId xmlns:p14="http://schemas.microsoft.com/office/powerpoint/2010/main" val="2972038107"/>
+      </p:ext>
+    </p:extLst>
+  </p:cSld>
+  <p:clrMapOvr>
+    <a:masterClrMapping/>
+  </p:clrMapOvr>
+</p:sld>
+</file>
+
+<file path=ppt/slides/slide25.xml><?xml version="1.0" encoding="utf-8"?>
+<p:sld xmlns:a="http://schemas.openxmlformats.org/drawingml/2006/main" xmlns:r="http://schemas.openxmlformats.org/officeDocument/2006/relationships" xmlns:p="http://schemas.openxmlformats.org/presentationml/2006/main">
+  <p:cSld>
+    <p:spTree>
+      <p:nvGrpSpPr>
+        <p:cNvPr id="1" name=""/>
+        <p:cNvGrpSpPr/>
+        <p:nvPr/>
+      </p:nvGrpSpPr>
+      <p:grpSpPr>
+        <a:xfrm>
+          <a:off x="0" y="0"/>
+          <a:ext cx="0" cy="0"/>
+          <a:chOff x="0" y="0"/>
+          <a:chExt cx="0" cy="0"/>
+        </a:xfrm>
+      </p:grpSpPr>
+      <p:sp>
+        <p:nvSpPr>
+          <p:cNvPr id="2" name="Title 1">
+            <a:extLst>
+              <a:ext uri="{FF2B5EF4-FFF2-40B4-BE49-F238E27FC236}">
+                <a16:creationId xmlns:a16="http://schemas.microsoft.com/office/drawing/2014/main" id="{FA4A219A-70F0-773A-81B8-08A45FCF39FA}"/>
+              </a:ext>
+            </a:extLst>
+          </p:cNvPr>
+          <p:cNvSpPr>
+            <a:spLocks noGrp="1"/>
+          </p:cNvSpPr>
+          <p:nvPr>
+            <p:ph type="title"/>
+          </p:nvPr>
+        </p:nvSpPr>
+        <p:spPr/>
+        <p:txBody>
+          <a:bodyPr/>
+          <a:lstStyle/>
+          <a:p>
+            <a:r>
+              <a:rPr lang="en-US" dirty="0"/>
+              <a:t>Prepare – visualization </a:t>
+            </a:r>
+          </a:p>
+        </p:txBody>
+      </p:sp>
+      <p:sp>
+        <p:nvSpPr>
+          <p:cNvPr id="3" name="Content Placeholder 2">
+            <a:extLst>
+              <a:ext uri="{FF2B5EF4-FFF2-40B4-BE49-F238E27FC236}">
+                <a16:creationId xmlns:a16="http://schemas.microsoft.com/office/drawing/2014/main" id="{64C827AE-726E-2566-B465-6E9719C90FAC}"/>
+              </a:ext>
+            </a:extLst>
+          </p:cNvPr>
+          <p:cNvSpPr>
+            <a:spLocks noGrp="1"/>
+          </p:cNvSpPr>
+          <p:nvPr>
+            <p:ph idx="1"/>
+          </p:nvPr>
+        </p:nvSpPr>
+        <p:spPr/>
+        <p:txBody>
+          <a:bodyPr/>
+          <a:lstStyle/>
+          <a:p>
+            <a:r>
+              <a:rPr lang="en-US" u="sng" dirty="0"/>
+              <a:t>General Observations based on visualizations  </a:t>
+            </a:r>
+            <a:r>
+              <a:rPr lang="en-US" dirty="0"/>
+              <a:t>We are not too concerned about possible lack of normal distributions to the data.  We only worry about this if using an algorithm that requires normal distribution.  Right now, the possible lack of normality is merely noted.  We only need to act upon this if the algorithm used calls for data with normal distributions.  </a:t>
+            </a:r>
+          </a:p>
+          <a:p>
+            <a:r>
+              <a:rPr lang="en-US" dirty="0"/>
+              <a:t>POVERTY may be ordinal.  Again, this is not a problem right now, but must be noted when determining the type of algorithm to use.  </a:t>
+            </a:r>
+          </a:p>
+          <a:p>
+            <a:r>
+              <a:rPr lang="en-US" dirty="0"/>
+              <a:t>N = 21,944:  This should be sufficient to run an analysis.</a:t>
+            </a:r>
+          </a:p>
+          <a:p>
+            <a:r>
+              <a:rPr lang="en-US" dirty="0"/>
+              <a:t>All our data is categorical.  It may make sense to transform the data into binary forms to simplify the model and reduce computational power.  However, there are only 4 variables in total, with 3 to 4 levels.  The resulting model, and computational power required to train model may not be that complex.  For now, no changes will be made to structure of data.  </a:t>
+            </a:r>
+          </a:p>
+          <a:p>
+            <a:endParaRPr lang="en-US" dirty="0"/>
+          </a:p>
+        </p:txBody>
+      </p:sp>
+    </p:spTree>
+    <p:extLst>
+      <p:ext uri="{BB962C8B-B14F-4D97-AF65-F5344CB8AC3E}">
+        <p14:creationId xmlns:p14="http://schemas.microsoft.com/office/powerpoint/2010/main" val="647334148"/>
       </p:ext>
     </p:extLst>
   </p:cSld>
@@ -10487,20 +11161,20 @@
 </file>
 
 <file path=customXml/item1.xml><?xml version="1.0" encoding="utf-8"?>
-<p:properties xmlns:p="http://schemas.microsoft.com/office/2006/metadata/properties" xmlns:xsi="http://www.w3.org/2001/XMLSchema-instance" xmlns:pc="http://schemas.microsoft.com/office/infopath/2007/PartnerControls">
-  <documentManagement>
-    <MediaServiceKeyPoints xmlns="71af3243-3dd4-4a8d-8c0d-dd76da1f02a5" xsi:nil="true"/>
-  </documentManagement>
-</p:properties>
-</file>
-
-<file path=customXml/item2.xml><?xml version="1.0" encoding="utf-8"?>
 <?mso-contentType ?>
 <FormTemplates xmlns="http://schemas.microsoft.com/sharepoint/v3/contenttype/forms">
   <Display>DocumentLibraryForm</Display>
   <Edit>DocumentLibraryForm</Edit>
   <New>DocumentLibraryForm</New>
 </FormTemplates>
+</file>
+
+<file path=customXml/item2.xml><?xml version="1.0" encoding="utf-8"?>
+<p:properties xmlns:p="http://schemas.microsoft.com/office/2006/metadata/properties" xmlns:xsi="http://www.w3.org/2001/XMLSchema-instance" xmlns:pc="http://schemas.microsoft.com/office/infopath/2007/PartnerControls">
+  <documentManagement>
+    <MediaServiceKeyPoints xmlns="71af3243-3dd4-4a8d-8c0d-dd76da1f02a5" xsi:nil="true"/>
+  </documentManagement>
+</p:properties>
 </file>
 
 <file path=customXml/item3.xml><?xml version="1.0" encoding="utf-8"?>
@@ -10715,19 +11389,19 @@
 </file>
 
 <file path=customXml/itemProps1.xml><?xml version="1.0" encoding="utf-8"?>
+<ds:datastoreItem xmlns:ds="http://schemas.openxmlformats.org/officeDocument/2006/customXml" ds:itemID="{FE57094B-4684-420B-AFE0-4E41CA2AF714}">
+  <ds:schemaRefs>
+    <ds:schemaRef ds:uri="http://schemas.microsoft.com/sharepoint/v3/contenttype/forms"/>
+  </ds:schemaRefs>
+</ds:datastoreItem>
+</file>
+
+<file path=customXml/itemProps2.xml><?xml version="1.0" encoding="utf-8"?>
 <ds:datastoreItem xmlns:ds="http://schemas.openxmlformats.org/officeDocument/2006/customXml" ds:itemID="{B26D5668-1971-40BB-BC7C-94C9B101AAB7}">
   <ds:schemaRefs>
     <ds:schemaRef ds:uri="http://schemas.microsoft.com/office/2006/metadata/properties"/>
     <ds:schemaRef ds:uri="http://schemas.microsoft.com/office/infopath/2007/PartnerControls"/>
     <ds:schemaRef ds:uri="71af3243-3dd4-4a8d-8c0d-dd76da1f02a5"/>
-  </ds:schemaRefs>
-</ds:datastoreItem>
-</file>
-
-<file path=customXml/itemProps2.xml><?xml version="1.0" encoding="utf-8"?>
-<ds:datastoreItem xmlns:ds="http://schemas.openxmlformats.org/officeDocument/2006/customXml" ds:itemID="{FE57094B-4684-420B-AFE0-4E41CA2AF714}">
-  <ds:schemaRefs>
-    <ds:schemaRef ds:uri="http://schemas.microsoft.com/sharepoint/v3/contenttype/forms"/>
   </ds:schemaRefs>
 </ds:datastoreItem>
 </file>

</xml_diff>